<commit_message>
correc + version pdf
</commit_message>
<xml_diff>
--- a/rapport/sout_AR.pptx
+++ b/rapport/sout_AR.pptx
@@ -5203,19 +5203,7 @@
           <a:p>
             <a:r>
               <a:rPr lang="fr-FR" sz="3200" dirty="0" smtClean="0"/>
-              <a:t>Un projet qui nous aura </a:t>
-            </a:r>
-            <a:r>
-              <a:rPr lang="fr-FR" sz="3200" dirty="0" smtClean="0"/>
-              <a:t>permis </a:t>
-            </a:r>
-            <a:r>
-              <a:rPr lang="fr-FR" sz="3200" dirty="0" smtClean="0"/>
-              <a:t>de comprendre en détails les notions </a:t>
-            </a:r>
-            <a:r>
-              <a:rPr lang="fr-FR" sz="3200" dirty="0" smtClean="0"/>
-              <a:t>abordées ce semestre</a:t>
+              <a:t>Un projet qui nous aura permis de comprendre en détails les notions abordées ce semestre</a:t>
             </a:r>
             <a:r>
               <a:rPr lang="fr-FR" sz="3200" dirty="0"/>
@@ -5802,12 +5790,16 @@
           <a:p>
             <a:pPr algn="ctr"/>
             <a:r>
-              <a:rPr lang="fr-FR" sz="5400" b="1" dirty="0" smtClean="0"/>
-              <a:t>Agent </a:t>
-            </a:r>
-            <a:r>
               <a:rPr lang="fr-FR" sz="5400" b="1" dirty="0" err="1" smtClean="0"/>
               <a:t>LookForHotel</a:t>
+            </a:r>
+            <a:r>
+              <a:rPr lang="fr-FR" sz="5400" b="1" dirty="0" smtClean="0"/>
+              <a:t> – </a:t>
+            </a:r>
+            <a:r>
+              <a:rPr lang="fr-FR" sz="5400" b="1" dirty="0" err="1" smtClean="0"/>
+              <a:t>get_hotels</a:t>
             </a:r>
             <a:endParaRPr lang="fr-FR" sz="5400" b="1" dirty="0"/>
           </a:p>
@@ -5948,11 +5940,11 @@
             <a:pPr algn="ctr"/>
             <a:r>
               <a:rPr lang="fr-FR" sz="5400" b="1" dirty="0" smtClean="0"/>
-              <a:t>Agent </a:t>
+              <a:t>Service - </a:t>
             </a:r>
             <a:r>
               <a:rPr lang="fr-FR" sz="5400" b="1" dirty="0" err="1" smtClean="0"/>
-              <a:t>LookForHotel</a:t>
+              <a:t>Hotels</a:t>
             </a:r>
             <a:endParaRPr lang="fr-FR" sz="5400" b="1" dirty="0"/>
           </a:p>

</xml_diff>